<commit_message>
Added ppt, Updated requirements.txt
</commit_message>
<xml_diff>
--- a/Exposys Internship report.pptx
+++ b/Exposys Internship report.pptx
@@ -7,6 +7,16 @@
   <p:sldIdLst>
     <p:sldId id="256" r:id="rId2"/>
     <p:sldId id="257" r:id="rId3"/>
+    <p:sldId id="258" r:id="rId4"/>
+    <p:sldId id="259" r:id="rId5"/>
+    <p:sldId id="260" r:id="rId6"/>
+    <p:sldId id="261" r:id="rId7"/>
+    <p:sldId id="262" r:id="rId8"/>
+    <p:sldId id="263" r:id="rId9"/>
+    <p:sldId id="264" r:id="rId10"/>
+    <p:sldId id="266" r:id="rId11"/>
+    <p:sldId id="267" r:id="rId12"/>
+    <p:sldId id="265" r:id="rId13"/>
   </p:sldIdLst>
   <p:sldSz cx="12192000" cy="6858000"/>
   <p:notesSz cx="6858000" cy="9144000"/>
@@ -20695,6 +20705,423 @@
 </p:sld>
 </file>
 
+<file path=ppt/slides/slide10.xml><?xml version="1.0" encoding="utf-8"?>
+<p:sld xmlns:a="http://schemas.openxmlformats.org/drawingml/2006/main" xmlns:r="http://schemas.openxmlformats.org/officeDocument/2006/relationships" xmlns:p="http://schemas.openxmlformats.org/presentationml/2006/main">
+  <p:cSld>
+    <p:spTree>
+      <p:nvGrpSpPr>
+        <p:cNvPr id="1" name=""/>
+        <p:cNvGrpSpPr/>
+        <p:nvPr/>
+      </p:nvGrpSpPr>
+      <p:grpSpPr>
+        <a:xfrm>
+          <a:off x="0" y="0"/>
+          <a:ext cx="0" cy="0"/>
+          <a:chOff x="0" y="0"/>
+          <a:chExt cx="0" cy="0"/>
+        </a:xfrm>
+      </p:grpSpPr>
+      <p:sp>
+        <p:nvSpPr>
+          <p:cNvPr id="2" name="Title 1">
+            <a:extLst>
+              <a:ext uri="{FF2B5EF4-FFF2-40B4-BE49-F238E27FC236}">
+                <a16:creationId xmlns:a16="http://schemas.microsoft.com/office/drawing/2014/main" id="{D01B63EA-BD50-D05A-AB72-1D84B3048A32}"/>
+              </a:ext>
+            </a:extLst>
+          </p:cNvPr>
+          <p:cNvSpPr>
+            <a:spLocks noGrp="1"/>
+          </p:cNvSpPr>
+          <p:nvPr>
+            <p:ph type="title"/>
+          </p:nvPr>
+        </p:nvSpPr>
+        <p:spPr/>
+        <p:txBody>
+          <a:bodyPr/>
+          <a:lstStyle/>
+          <a:p>
+            <a:r>
+              <a:rPr lang="en-US" dirty="0"/>
+              <a:t>Implementation</a:t>
+            </a:r>
+            <a:endParaRPr lang="en-IN" dirty="0"/>
+          </a:p>
+        </p:txBody>
+      </p:sp>
+      <p:sp>
+        <p:nvSpPr>
+          <p:cNvPr id="3" name="Content Placeholder 2">
+            <a:extLst>
+              <a:ext uri="{FF2B5EF4-FFF2-40B4-BE49-F238E27FC236}">
+                <a16:creationId xmlns:a16="http://schemas.microsoft.com/office/drawing/2014/main" id="{D611E4FA-3305-CAE9-9899-33DBA044FCC8}"/>
+              </a:ext>
+            </a:extLst>
+          </p:cNvPr>
+          <p:cNvSpPr>
+            <a:spLocks noGrp="1"/>
+          </p:cNvSpPr>
+          <p:nvPr>
+            <p:ph idx="1"/>
+          </p:nvPr>
+        </p:nvSpPr>
+        <p:spPr/>
+        <p:txBody>
+          <a:bodyPr>
+            <a:normAutofit/>
+          </a:bodyPr>
+          <a:lstStyle/>
+          <a:p>
+            <a:pPr lvl="1"/>
+            <a:r>
+              <a:rPr lang="en-US" sz="2400" dirty="0"/>
+              <a:t>To get started download the codebase from the github.com/anirudhp06/Company-Profit-Prediction</a:t>
+            </a:r>
+          </a:p>
+          <a:p>
+            <a:pPr lvl="1"/>
+            <a:r>
+              <a:rPr lang="en-US" sz="2400" dirty="0"/>
+              <a:t>The folder will consist of “requirements.txt” text file, by using pip install all the dependencies `pip install –r requirements.txt`</a:t>
+            </a:r>
+          </a:p>
+          <a:p>
+            <a:pPr lvl="1"/>
+            <a:r>
+              <a:rPr lang="en-US" sz="2400" dirty="0"/>
+              <a:t>Once all dependencies are installed open the </a:t>
+            </a:r>
+            <a:r>
+              <a:rPr lang="en-US" sz="2400" dirty="0" err="1"/>
+              <a:t>jupyter</a:t>
+            </a:r>
+            <a:r>
+              <a:rPr lang="en-US" sz="2400" dirty="0"/>
+              <a:t> notebook by command `</a:t>
+            </a:r>
+            <a:r>
+              <a:rPr lang="en-US" sz="2400" dirty="0" err="1"/>
+              <a:t>jupyter</a:t>
+            </a:r>
+            <a:r>
+              <a:rPr lang="en-US" sz="2400" dirty="0"/>
+              <a:t> notebook`</a:t>
+            </a:r>
+          </a:p>
+          <a:p>
+            <a:pPr lvl="1"/>
+            <a:r>
+              <a:rPr lang="en-US" sz="2400" dirty="0"/>
+              <a:t>If you have any changes to make you can freely make them.</a:t>
+            </a:r>
+          </a:p>
+          <a:p>
+            <a:pPr lvl="1"/>
+            <a:r>
+              <a:rPr lang="en-US" sz="2400" dirty="0"/>
+              <a:t>To start with prediction we need to use </a:t>
+            </a:r>
+            <a:r>
+              <a:rPr lang="en-US" sz="2400" dirty="0" err="1"/>
+              <a:t>streamlit</a:t>
+            </a:r>
+            <a:r>
+              <a:rPr lang="en-US" sz="2400" dirty="0"/>
+              <a:t> library.</a:t>
+            </a:r>
+          </a:p>
+          <a:p>
+            <a:pPr lvl="1"/>
+            <a:r>
+              <a:rPr lang="en-US" sz="2400" dirty="0"/>
+              <a:t>In terminal execute the command `</a:t>
+            </a:r>
+            <a:r>
+              <a:rPr lang="en-US" sz="2400" dirty="0" err="1"/>
+              <a:t>streamlit</a:t>
+            </a:r>
+            <a:r>
+              <a:rPr lang="en-US" sz="2400" dirty="0"/>
+              <a:t> run app.py` this will open new browser window and there we can start predicting.</a:t>
+            </a:r>
+            <a:endParaRPr lang="en-IN" sz="2400" dirty="0"/>
+          </a:p>
+        </p:txBody>
+      </p:sp>
+    </p:spTree>
+    <p:extLst>
+      <p:ext uri="{BB962C8B-B14F-4D97-AF65-F5344CB8AC3E}">
+        <p14:creationId xmlns:p14="http://schemas.microsoft.com/office/powerpoint/2010/main" val="2957922886"/>
+      </p:ext>
+    </p:extLst>
+  </p:cSld>
+  <p:clrMapOvr>
+    <a:masterClrMapping/>
+  </p:clrMapOvr>
+</p:sld>
+</file>
+
+<file path=ppt/slides/slide11.xml><?xml version="1.0" encoding="utf-8"?>
+<p:sld xmlns:a="http://schemas.openxmlformats.org/drawingml/2006/main" xmlns:r="http://schemas.openxmlformats.org/officeDocument/2006/relationships" xmlns:p="http://schemas.openxmlformats.org/presentationml/2006/main">
+  <p:cSld>
+    <p:spTree>
+      <p:nvGrpSpPr>
+        <p:cNvPr id="1" name=""/>
+        <p:cNvGrpSpPr/>
+        <p:nvPr/>
+      </p:nvGrpSpPr>
+      <p:grpSpPr>
+        <a:xfrm>
+          <a:off x="0" y="0"/>
+          <a:ext cx="0" cy="0"/>
+          <a:chOff x="0" y="0"/>
+          <a:chExt cx="0" cy="0"/>
+        </a:xfrm>
+      </p:grpSpPr>
+      <p:sp>
+        <p:nvSpPr>
+          <p:cNvPr id="2" name="Title 1">
+            <a:extLst>
+              <a:ext uri="{FF2B5EF4-FFF2-40B4-BE49-F238E27FC236}">
+                <a16:creationId xmlns:a16="http://schemas.microsoft.com/office/drawing/2014/main" id="{B4EB0B28-2325-CB3E-66D7-68B4C23614A3}"/>
+              </a:ext>
+            </a:extLst>
+          </p:cNvPr>
+          <p:cNvSpPr>
+            <a:spLocks noGrp="1"/>
+          </p:cNvSpPr>
+          <p:nvPr>
+            <p:ph type="title"/>
+          </p:nvPr>
+        </p:nvSpPr>
+        <p:spPr/>
+        <p:txBody>
+          <a:bodyPr/>
+          <a:lstStyle/>
+          <a:p>
+            <a:r>
+              <a:rPr lang="en-US" dirty="0"/>
+              <a:t>Implementation </a:t>
+            </a:r>
+            <a:r>
+              <a:rPr lang="en-US" dirty="0" err="1"/>
+              <a:t>contd</a:t>
+            </a:r>
+            <a:r>
+              <a:rPr lang="en-US" dirty="0"/>
+              <a:t>…</a:t>
+            </a:r>
+            <a:endParaRPr lang="en-IN" dirty="0"/>
+          </a:p>
+        </p:txBody>
+      </p:sp>
+      <p:sp>
+        <p:nvSpPr>
+          <p:cNvPr id="3" name="Content Placeholder 2">
+            <a:extLst>
+              <a:ext uri="{FF2B5EF4-FFF2-40B4-BE49-F238E27FC236}">
+                <a16:creationId xmlns:a16="http://schemas.microsoft.com/office/drawing/2014/main" id="{CC59A024-40C9-8DCB-E246-E4E346ABD756}"/>
+              </a:ext>
+            </a:extLst>
+          </p:cNvPr>
+          <p:cNvSpPr>
+            <a:spLocks noGrp="1"/>
+          </p:cNvSpPr>
+          <p:nvPr>
+            <p:ph idx="1"/>
+          </p:nvPr>
+        </p:nvSpPr>
+        <p:spPr/>
+        <p:txBody>
+          <a:bodyPr>
+            <a:normAutofit/>
+          </a:bodyPr>
+          <a:lstStyle/>
+          <a:p>
+            <a:pPr lvl="1"/>
+            <a:r>
+              <a:rPr lang="en-US" sz="2400" dirty="0"/>
+              <a:t>Further we can make changes to the `app.py` file according to our requirements.</a:t>
+            </a:r>
+          </a:p>
+          <a:p>
+            <a:pPr lvl="1"/>
+            <a:r>
+              <a:rPr lang="en-US" sz="2400" dirty="0" err="1"/>
+              <a:t>Streamlit</a:t>
+            </a:r>
+            <a:r>
+              <a:rPr lang="en-US" sz="2400" dirty="0"/>
+              <a:t> enables user to have web user interface for machine learning programs.</a:t>
+            </a:r>
+          </a:p>
+          <a:p>
+            <a:pPr lvl="1"/>
+            <a:r>
+              <a:rPr lang="en-US" sz="2400" dirty="0"/>
+              <a:t>It is very easy to use.</a:t>
+            </a:r>
+          </a:p>
+          <a:p>
+            <a:pPr lvl="1"/>
+            <a:r>
+              <a:rPr lang="en-US" sz="2400" dirty="0"/>
+              <a:t>We can also host the </a:t>
+            </a:r>
+            <a:r>
+              <a:rPr lang="en-US" sz="2400" dirty="0" err="1"/>
+              <a:t>streamlit</a:t>
+            </a:r>
+            <a:r>
+              <a:rPr lang="en-US" sz="2400" dirty="0"/>
+              <a:t> application on cloud providers like Amazon AWS, Google Cloud Platform,</a:t>
+            </a:r>
+            <a:r>
+              <a:rPr lang="en-IN" sz="2400" dirty="0"/>
+              <a:t> Microsoft Azure, etc…</a:t>
+            </a:r>
+          </a:p>
+          <a:p>
+            <a:pPr lvl="1"/>
+            <a:r>
+              <a:rPr lang="en-IN" sz="2400" dirty="0" err="1"/>
+              <a:t>Streamlit</a:t>
+            </a:r>
+            <a:r>
+              <a:rPr lang="en-IN" sz="2400" dirty="0"/>
+              <a:t> enables developers to distribute the AI models easily to their clients.</a:t>
+            </a:r>
+            <a:endParaRPr lang="en-US" sz="2400" dirty="0"/>
+          </a:p>
+        </p:txBody>
+      </p:sp>
+    </p:spTree>
+    <p:extLst>
+      <p:ext uri="{BB962C8B-B14F-4D97-AF65-F5344CB8AC3E}">
+        <p14:creationId xmlns:p14="http://schemas.microsoft.com/office/powerpoint/2010/main" val="57277831"/>
+      </p:ext>
+    </p:extLst>
+  </p:cSld>
+  <p:clrMapOvr>
+    <a:masterClrMapping/>
+  </p:clrMapOvr>
+</p:sld>
+</file>
+
+<file path=ppt/slides/slide12.xml><?xml version="1.0" encoding="utf-8"?>
+<p:sld xmlns:a="http://schemas.openxmlformats.org/drawingml/2006/main" xmlns:r="http://schemas.openxmlformats.org/officeDocument/2006/relationships" xmlns:p="http://schemas.openxmlformats.org/presentationml/2006/main">
+  <p:cSld>
+    <p:spTree>
+      <p:nvGrpSpPr>
+        <p:cNvPr id="1" name=""/>
+        <p:cNvGrpSpPr/>
+        <p:nvPr/>
+      </p:nvGrpSpPr>
+      <p:grpSpPr>
+        <a:xfrm>
+          <a:off x="0" y="0"/>
+          <a:ext cx="0" cy="0"/>
+          <a:chOff x="0" y="0"/>
+          <a:chExt cx="0" cy="0"/>
+        </a:xfrm>
+      </p:grpSpPr>
+      <p:sp>
+        <p:nvSpPr>
+          <p:cNvPr id="2" name="Title 1">
+            <a:extLst>
+              <a:ext uri="{FF2B5EF4-FFF2-40B4-BE49-F238E27FC236}">
+                <a16:creationId xmlns:a16="http://schemas.microsoft.com/office/drawing/2014/main" id="{F0565A14-0B23-9070-3A4C-1FE09F60019A}"/>
+              </a:ext>
+            </a:extLst>
+          </p:cNvPr>
+          <p:cNvSpPr>
+            <a:spLocks noGrp="1"/>
+          </p:cNvSpPr>
+          <p:nvPr>
+            <p:ph type="title"/>
+          </p:nvPr>
+        </p:nvSpPr>
+        <p:spPr/>
+        <p:txBody>
+          <a:bodyPr/>
+          <a:lstStyle/>
+          <a:p>
+            <a:r>
+              <a:rPr lang="en-US" dirty="0"/>
+              <a:t>conclusion</a:t>
+            </a:r>
+            <a:endParaRPr lang="en-IN" dirty="0"/>
+          </a:p>
+        </p:txBody>
+      </p:sp>
+      <p:sp>
+        <p:nvSpPr>
+          <p:cNvPr id="3" name="Content Placeholder 2">
+            <a:extLst>
+              <a:ext uri="{FF2B5EF4-FFF2-40B4-BE49-F238E27FC236}">
+                <a16:creationId xmlns:a16="http://schemas.microsoft.com/office/drawing/2014/main" id="{BE03C877-5FF3-FB05-1CD4-B699EA413054}"/>
+              </a:ext>
+            </a:extLst>
+          </p:cNvPr>
+          <p:cNvSpPr>
+            <a:spLocks noGrp="1"/>
+          </p:cNvSpPr>
+          <p:nvPr>
+            <p:ph idx="1"/>
+          </p:nvPr>
+        </p:nvSpPr>
+        <p:spPr/>
+        <p:txBody>
+          <a:bodyPr>
+            <a:noAutofit/>
+          </a:bodyPr>
+          <a:lstStyle/>
+          <a:p>
+            <a:pPr lvl="1"/>
+            <a:r>
+              <a:rPr lang="en-US" sz="2400" dirty="0"/>
+              <a:t>The incorporation of diverse set of features, including financial metrics, &amp; market trends allowed for comprehensive representation of company’s operational environment.</a:t>
+            </a:r>
+          </a:p>
+          <a:p>
+            <a:pPr lvl="1"/>
+            <a:r>
+              <a:rPr lang="en-US" sz="2400" dirty="0"/>
+              <a:t>This enhanced dataset provided the model with valuable insights, enabling it to discern intricate patterns &amp; relationships that traditional methods may have missed.</a:t>
+            </a:r>
+          </a:p>
+          <a:p>
+            <a:pPr lvl="1"/>
+            <a:r>
+              <a:rPr lang="en-US" sz="2400" dirty="0"/>
+              <a:t>The evaluation of multiple machine learning algorithms demonstrated the advancement of technology and helped us in choosing right model for predicting profit with good accuracy.</a:t>
+            </a:r>
+          </a:p>
+          <a:p>
+            <a:pPr lvl="1"/>
+            <a:r>
+              <a:rPr lang="en-US" sz="2400" dirty="0"/>
+              <a:t>In conclusion, this project provides powerful model for business and investors for assisting them in making important decisions for their respective institutions.</a:t>
+            </a:r>
+            <a:endParaRPr lang="en-IN" sz="2400" dirty="0"/>
+          </a:p>
+        </p:txBody>
+      </p:sp>
+    </p:spTree>
+    <p:extLst>
+      <p:ext uri="{BB962C8B-B14F-4D97-AF65-F5344CB8AC3E}">
+        <p14:creationId xmlns:p14="http://schemas.microsoft.com/office/powerpoint/2010/main" val="2092599617"/>
+      </p:ext>
+    </p:extLst>
+  </p:cSld>
+  <p:clrMapOvr>
+    <a:masterClrMapping/>
+  </p:clrMapOvr>
+</p:sld>
+</file>
+
 <file path=ppt/slides/slide2.xml><?xml version="1.0" encoding="utf-8"?>
 <p:sld xmlns:a="http://schemas.openxmlformats.org/drawingml/2006/main" xmlns:r="http://schemas.openxmlformats.org/officeDocument/2006/relationships" xmlns:p="http://schemas.openxmlformats.org/presentationml/2006/main">
   <p:cSld>
@@ -20801,13 +21228,6 @@
             <a:pPr lvl="1"/>
             <a:r>
               <a:rPr lang="en-IN" sz="2400" dirty="0"/>
-              <a:t>System Architecture</a:t>
-            </a:r>
-          </a:p>
-          <a:p>
-            <a:pPr lvl="1"/>
-            <a:r>
-              <a:rPr lang="en-IN" sz="2400" dirty="0"/>
               <a:t>Modules</a:t>
             </a:r>
           </a:p>
@@ -20824,6 +21244,888 @@
     <p:extLst>
       <p:ext uri="{BB962C8B-B14F-4D97-AF65-F5344CB8AC3E}">
         <p14:creationId xmlns:p14="http://schemas.microsoft.com/office/powerpoint/2010/main" val="791394309"/>
+      </p:ext>
+    </p:extLst>
+  </p:cSld>
+  <p:clrMapOvr>
+    <a:masterClrMapping/>
+  </p:clrMapOvr>
+</p:sld>
+</file>
+
+<file path=ppt/slides/slide3.xml><?xml version="1.0" encoding="utf-8"?>
+<p:sld xmlns:a="http://schemas.openxmlformats.org/drawingml/2006/main" xmlns:r="http://schemas.openxmlformats.org/officeDocument/2006/relationships" xmlns:p="http://schemas.openxmlformats.org/presentationml/2006/main">
+  <p:cSld>
+    <p:spTree>
+      <p:nvGrpSpPr>
+        <p:cNvPr id="1" name=""/>
+        <p:cNvGrpSpPr/>
+        <p:nvPr/>
+      </p:nvGrpSpPr>
+      <p:grpSpPr>
+        <a:xfrm>
+          <a:off x="0" y="0"/>
+          <a:ext cx="0" cy="0"/>
+          <a:chOff x="0" y="0"/>
+          <a:chExt cx="0" cy="0"/>
+        </a:xfrm>
+      </p:grpSpPr>
+      <p:sp>
+        <p:nvSpPr>
+          <p:cNvPr id="2" name="Title 1">
+            <a:extLst>
+              <a:ext uri="{FF2B5EF4-FFF2-40B4-BE49-F238E27FC236}">
+                <a16:creationId xmlns:a16="http://schemas.microsoft.com/office/drawing/2014/main" id="{3A0C6D4B-A4CC-A29A-D304-3BBB36335A35}"/>
+              </a:ext>
+            </a:extLst>
+          </p:cNvPr>
+          <p:cNvSpPr>
+            <a:spLocks noGrp="1"/>
+          </p:cNvSpPr>
+          <p:nvPr>
+            <p:ph type="title"/>
+          </p:nvPr>
+        </p:nvSpPr>
+        <p:spPr/>
+        <p:txBody>
+          <a:bodyPr/>
+          <a:lstStyle/>
+          <a:p>
+            <a:r>
+              <a:rPr lang="en-US" dirty="0"/>
+              <a:t>Abstract</a:t>
+            </a:r>
+            <a:endParaRPr lang="en-IN" dirty="0"/>
+          </a:p>
+        </p:txBody>
+      </p:sp>
+      <p:sp>
+        <p:nvSpPr>
+          <p:cNvPr id="3" name="Content Placeholder 2">
+            <a:extLst>
+              <a:ext uri="{FF2B5EF4-FFF2-40B4-BE49-F238E27FC236}">
+                <a16:creationId xmlns:a16="http://schemas.microsoft.com/office/drawing/2014/main" id="{875132B6-A65B-9E69-3FE2-AFBC4C5D1069}"/>
+              </a:ext>
+            </a:extLst>
+          </p:cNvPr>
+          <p:cNvSpPr>
+            <a:spLocks noGrp="1"/>
+          </p:cNvSpPr>
+          <p:nvPr>
+            <p:ph idx="1"/>
+          </p:nvPr>
+        </p:nvSpPr>
+        <p:spPr/>
+        <p:txBody>
+          <a:bodyPr>
+            <a:normAutofit/>
+          </a:bodyPr>
+          <a:lstStyle/>
+          <a:p>
+            <a:pPr lvl="1"/>
+            <a:r>
+              <a:rPr lang="en-US" sz="2400" dirty="0"/>
+              <a:t>This project is mainly aimed to test out our data analytical skills which has to be applied to solve any data science problem.</a:t>
+            </a:r>
+          </a:p>
+          <a:p>
+            <a:pPr lvl="1"/>
+            <a:r>
+              <a:rPr lang="en-US" sz="2400" dirty="0"/>
+              <a:t>This project aims to predict company profit based on how much a company has invested in research, administration, marketing.</a:t>
+            </a:r>
+          </a:p>
+          <a:p>
+            <a:pPr lvl="1"/>
+            <a:r>
+              <a:rPr lang="en-US" sz="2400" dirty="0"/>
+              <a:t>This internship aims to contribute into the financial sector by presenting innovative data driven approach for predicting profits for any given company.</a:t>
+            </a:r>
+          </a:p>
+          <a:p>
+            <a:pPr lvl="1"/>
+            <a:r>
+              <a:rPr lang="en-US" sz="2400" dirty="0"/>
+              <a:t>This model can be used by any company in their financial analytics, investors and corporate </a:t>
+            </a:r>
+            <a:r>
+              <a:rPr lang="en-US" sz="2400" dirty="0" err="1"/>
+              <a:t>stratergies</a:t>
+            </a:r>
+            <a:r>
+              <a:rPr lang="en-US" sz="2400" dirty="0"/>
+              <a:t> to enhance their decision making process.</a:t>
+            </a:r>
+            <a:endParaRPr lang="en-IN" sz="2400" dirty="0"/>
+          </a:p>
+        </p:txBody>
+      </p:sp>
+    </p:spTree>
+    <p:extLst>
+      <p:ext uri="{BB962C8B-B14F-4D97-AF65-F5344CB8AC3E}">
+        <p14:creationId xmlns:p14="http://schemas.microsoft.com/office/powerpoint/2010/main" val="2538494559"/>
+      </p:ext>
+    </p:extLst>
+  </p:cSld>
+  <p:clrMapOvr>
+    <a:masterClrMapping/>
+  </p:clrMapOvr>
+</p:sld>
+</file>
+
+<file path=ppt/slides/slide4.xml><?xml version="1.0" encoding="utf-8"?>
+<p:sld xmlns:a="http://schemas.openxmlformats.org/drawingml/2006/main" xmlns:r="http://schemas.openxmlformats.org/officeDocument/2006/relationships" xmlns:p="http://schemas.openxmlformats.org/presentationml/2006/main">
+  <p:cSld>
+    <p:spTree>
+      <p:nvGrpSpPr>
+        <p:cNvPr id="1" name=""/>
+        <p:cNvGrpSpPr/>
+        <p:nvPr/>
+      </p:nvGrpSpPr>
+      <p:grpSpPr>
+        <a:xfrm>
+          <a:off x="0" y="0"/>
+          <a:ext cx="0" cy="0"/>
+          <a:chOff x="0" y="0"/>
+          <a:chExt cx="0" cy="0"/>
+        </a:xfrm>
+      </p:grpSpPr>
+      <p:sp>
+        <p:nvSpPr>
+          <p:cNvPr id="2" name="Title 1">
+            <a:extLst>
+              <a:ext uri="{FF2B5EF4-FFF2-40B4-BE49-F238E27FC236}">
+                <a16:creationId xmlns:a16="http://schemas.microsoft.com/office/drawing/2014/main" id="{62CABAD7-A53F-CAD4-F02D-4C974AC6F042}"/>
+              </a:ext>
+            </a:extLst>
+          </p:cNvPr>
+          <p:cNvSpPr>
+            <a:spLocks noGrp="1"/>
+          </p:cNvSpPr>
+          <p:nvPr>
+            <p:ph type="title"/>
+          </p:nvPr>
+        </p:nvSpPr>
+        <p:spPr/>
+        <p:txBody>
+          <a:bodyPr/>
+          <a:lstStyle/>
+          <a:p>
+            <a:r>
+              <a:rPr lang="en-US" dirty="0"/>
+              <a:t>introduction</a:t>
+            </a:r>
+            <a:endParaRPr lang="en-IN" dirty="0"/>
+          </a:p>
+        </p:txBody>
+      </p:sp>
+      <p:sp>
+        <p:nvSpPr>
+          <p:cNvPr id="3" name="Content Placeholder 2">
+            <a:extLst>
+              <a:ext uri="{FF2B5EF4-FFF2-40B4-BE49-F238E27FC236}">
+                <a16:creationId xmlns:a16="http://schemas.microsoft.com/office/drawing/2014/main" id="{6BEB80B8-A8AF-00FE-1B18-8C116072A119}"/>
+              </a:ext>
+            </a:extLst>
+          </p:cNvPr>
+          <p:cNvSpPr>
+            <a:spLocks noGrp="1"/>
+          </p:cNvSpPr>
+          <p:nvPr>
+            <p:ph idx="1"/>
+          </p:nvPr>
+        </p:nvSpPr>
+        <p:spPr/>
+        <p:txBody>
+          <a:bodyPr>
+            <a:noAutofit/>
+          </a:bodyPr>
+          <a:lstStyle/>
+          <a:p>
+            <a:pPr lvl="1"/>
+            <a:r>
+              <a:rPr lang="en-US" sz="2400" dirty="0"/>
+              <a:t>It is important in today’s market to stay ahead of the competition and estimate their profits for a product before it’s been launched, this helps them to use resources they have at their disposal efficiently.</a:t>
+            </a:r>
+          </a:p>
+          <a:p>
+            <a:pPr lvl="1"/>
+            <a:r>
+              <a:rPr lang="en-US" sz="2400" dirty="0"/>
+              <a:t>In recent times technology is evolving at faster pace and data is being generated everywhere, company’s make use of these largely generated data for their advantage like: making future prediction about their product, understanding their customers </a:t>
+            </a:r>
+            <a:r>
+              <a:rPr lang="en-US" sz="2400" dirty="0" err="1"/>
+              <a:t>etc</a:t>
+            </a:r>
+            <a:r>
+              <a:rPr lang="en-US" sz="2400" dirty="0"/>
+              <a:t>…</a:t>
+            </a:r>
+          </a:p>
+          <a:p>
+            <a:pPr lvl="1"/>
+            <a:r>
+              <a:rPr lang="en-US" sz="2400" dirty="0"/>
+              <a:t>The dataset that is used in this project comprises of historical financial data, market trends &amp; other economic indicators. These variables shape company’s financial performance and are important for accurate profit prediction.</a:t>
+            </a:r>
+          </a:p>
+        </p:txBody>
+      </p:sp>
+    </p:spTree>
+    <p:extLst>
+      <p:ext uri="{BB962C8B-B14F-4D97-AF65-F5344CB8AC3E}">
+        <p14:creationId xmlns:p14="http://schemas.microsoft.com/office/powerpoint/2010/main" val="3713221803"/>
+      </p:ext>
+    </p:extLst>
+  </p:cSld>
+  <p:clrMapOvr>
+    <a:masterClrMapping/>
+  </p:clrMapOvr>
+</p:sld>
+</file>
+
+<file path=ppt/slides/slide5.xml><?xml version="1.0" encoding="utf-8"?>
+<p:sld xmlns:a="http://schemas.openxmlformats.org/drawingml/2006/main" xmlns:r="http://schemas.openxmlformats.org/officeDocument/2006/relationships" xmlns:p="http://schemas.openxmlformats.org/presentationml/2006/main">
+  <p:cSld>
+    <p:spTree>
+      <p:nvGrpSpPr>
+        <p:cNvPr id="1" name=""/>
+        <p:cNvGrpSpPr/>
+        <p:nvPr/>
+      </p:nvGrpSpPr>
+      <p:grpSpPr>
+        <a:xfrm>
+          <a:off x="0" y="0"/>
+          <a:ext cx="0" cy="0"/>
+          <a:chOff x="0" y="0"/>
+          <a:chExt cx="0" cy="0"/>
+        </a:xfrm>
+      </p:grpSpPr>
+      <p:sp>
+        <p:nvSpPr>
+          <p:cNvPr id="2" name="Title 1">
+            <a:extLst>
+              <a:ext uri="{FF2B5EF4-FFF2-40B4-BE49-F238E27FC236}">
+                <a16:creationId xmlns:a16="http://schemas.microsoft.com/office/drawing/2014/main" id="{85F58D41-117F-9D13-339E-F4EA821F4636}"/>
+              </a:ext>
+            </a:extLst>
+          </p:cNvPr>
+          <p:cNvSpPr>
+            <a:spLocks noGrp="1"/>
+          </p:cNvSpPr>
+          <p:nvPr>
+            <p:ph type="title"/>
+          </p:nvPr>
+        </p:nvSpPr>
+        <p:spPr/>
+        <p:txBody>
+          <a:bodyPr/>
+          <a:lstStyle/>
+          <a:p>
+            <a:r>
+              <a:rPr lang="en-US" dirty="0"/>
+              <a:t>Objective</a:t>
+            </a:r>
+            <a:endParaRPr lang="en-IN" dirty="0"/>
+          </a:p>
+        </p:txBody>
+      </p:sp>
+      <p:sp>
+        <p:nvSpPr>
+          <p:cNvPr id="3" name="Content Placeholder 2">
+            <a:extLst>
+              <a:ext uri="{FF2B5EF4-FFF2-40B4-BE49-F238E27FC236}">
+                <a16:creationId xmlns:a16="http://schemas.microsoft.com/office/drawing/2014/main" id="{673A562C-DD9C-5FDE-DA34-29BE2E6FED22}"/>
+              </a:ext>
+            </a:extLst>
+          </p:cNvPr>
+          <p:cNvSpPr>
+            <a:spLocks noGrp="1"/>
+          </p:cNvSpPr>
+          <p:nvPr>
+            <p:ph idx="1"/>
+          </p:nvPr>
+        </p:nvSpPr>
+        <p:spPr/>
+        <p:txBody>
+          <a:bodyPr>
+            <a:normAutofit/>
+          </a:bodyPr>
+          <a:lstStyle/>
+          <a:p>
+            <a:pPr lvl="1"/>
+            <a:r>
+              <a:rPr lang="en-US" sz="2400" dirty="0"/>
+              <a:t>The objective of the ML model is to develop a predictive model that can accurately forecast the profit value of a company.</a:t>
+            </a:r>
+          </a:p>
+          <a:p>
+            <a:pPr lvl="1"/>
+            <a:r>
+              <a:rPr lang="en-US" sz="2400" dirty="0"/>
+              <a:t>The important aspect is to identify parameter on which the model will predict the profit, some of the parameters identified are: R&amp;D spend, administration cost &amp; marketing spend.</a:t>
+            </a:r>
+          </a:p>
+          <a:p>
+            <a:pPr lvl="1"/>
+            <a:r>
+              <a:rPr lang="en-US" sz="2400" dirty="0"/>
+              <a:t>Additionally, the objective is to create a user-friendly and scalable solution that can be easily adopted by businesses of all sizes and industries.</a:t>
+            </a:r>
+          </a:p>
+          <a:p>
+            <a:pPr lvl="1"/>
+            <a:endParaRPr lang="en-IN" sz="2400" dirty="0"/>
+          </a:p>
+        </p:txBody>
+      </p:sp>
+    </p:spTree>
+    <p:extLst>
+      <p:ext uri="{BB962C8B-B14F-4D97-AF65-F5344CB8AC3E}">
+        <p14:creationId xmlns:p14="http://schemas.microsoft.com/office/powerpoint/2010/main" val="3669000289"/>
+      </p:ext>
+    </p:extLst>
+  </p:cSld>
+  <p:clrMapOvr>
+    <a:masterClrMapping/>
+  </p:clrMapOvr>
+</p:sld>
+</file>
+
+<file path=ppt/slides/slide6.xml><?xml version="1.0" encoding="utf-8"?>
+<p:sld xmlns:a="http://schemas.openxmlformats.org/drawingml/2006/main" xmlns:r="http://schemas.openxmlformats.org/officeDocument/2006/relationships" xmlns:p="http://schemas.openxmlformats.org/presentationml/2006/main">
+  <p:cSld>
+    <p:spTree>
+      <p:nvGrpSpPr>
+        <p:cNvPr id="1" name=""/>
+        <p:cNvGrpSpPr/>
+        <p:nvPr/>
+      </p:nvGrpSpPr>
+      <p:grpSpPr>
+        <a:xfrm>
+          <a:off x="0" y="0"/>
+          <a:ext cx="0" cy="0"/>
+          <a:chOff x="0" y="0"/>
+          <a:chExt cx="0" cy="0"/>
+        </a:xfrm>
+      </p:grpSpPr>
+      <p:sp>
+        <p:nvSpPr>
+          <p:cNvPr id="2" name="Title 1">
+            <a:extLst>
+              <a:ext uri="{FF2B5EF4-FFF2-40B4-BE49-F238E27FC236}">
+                <a16:creationId xmlns:a16="http://schemas.microsoft.com/office/drawing/2014/main" id="{EB759B35-BC98-2EC8-BF3F-E08F1C694B42}"/>
+              </a:ext>
+            </a:extLst>
+          </p:cNvPr>
+          <p:cNvSpPr>
+            <a:spLocks noGrp="1"/>
+          </p:cNvSpPr>
+          <p:nvPr>
+            <p:ph type="title"/>
+          </p:nvPr>
+        </p:nvSpPr>
+        <p:spPr/>
+        <p:txBody>
+          <a:bodyPr/>
+          <a:lstStyle/>
+          <a:p>
+            <a:r>
+              <a:rPr lang="en-US" dirty="0"/>
+              <a:t>Existing system</a:t>
+            </a:r>
+            <a:endParaRPr lang="en-IN" dirty="0"/>
+          </a:p>
+        </p:txBody>
+      </p:sp>
+      <p:sp>
+        <p:nvSpPr>
+          <p:cNvPr id="3" name="Content Placeholder 2">
+            <a:extLst>
+              <a:ext uri="{FF2B5EF4-FFF2-40B4-BE49-F238E27FC236}">
+                <a16:creationId xmlns:a16="http://schemas.microsoft.com/office/drawing/2014/main" id="{225E1B9A-C0D5-1C0B-2AA5-59EDDE1B8727}"/>
+              </a:ext>
+            </a:extLst>
+          </p:cNvPr>
+          <p:cNvSpPr>
+            <a:spLocks noGrp="1"/>
+          </p:cNvSpPr>
+          <p:nvPr>
+            <p:ph idx="1"/>
+          </p:nvPr>
+        </p:nvSpPr>
+        <p:spPr/>
+        <p:txBody>
+          <a:bodyPr>
+            <a:normAutofit/>
+          </a:bodyPr>
+          <a:lstStyle/>
+          <a:p>
+            <a:pPr lvl="1"/>
+            <a:r>
+              <a:rPr lang="en-US" sz="2400" dirty="0"/>
+              <a:t>The existing system primarily relies on traditional methods to estimate profit for any organization.</a:t>
+            </a:r>
+          </a:p>
+          <a:p>
+            <a:pPr lvl="1"/>
+            <a:r>
+              <a:rPr lang="en-US" sz="2400" dirty="0"/>
+              <a:t>As these are traditional methods, given some new scenarios they won’t perform as expected to current requirement. This can be due to the complex data that is being produced in day-to-day lives.</a:t>
+            </a:r>
+          </a:p>
+          <a:p>
+            <a:pPr lvl="1"/>
+            <a:r>
+              <a:rPr lang="en-US" sz="2400" dirty="0"/>
+              <a:t>Traditional methods struggle to account for non-linear relationships in any given data, sudden shift in market trends, impact of internal and external factors for the company.</a:t>
+            </a:r>
+          </a:p>
+          <a:p>
+            <a:pPr lvl="1"/>
+            <a:r>
+              <a:rPr lang="en-US" sz="2400" dirty="0"/>
+              <a:t>Further more these traditional methods may not fully utilize the vast data that is being generated in the recent times therefore we might not be able to predict accurate results.</a:t>
+            </a:r>
+            <a:endParaRPr lang="en-IN" sz="2400" dirty="0"/>
+          </a:p>
+        </p:txBody>
+      </p:sp>
+    </p:spTree>
+    <p:extLst>
+      <p:ext uri="{BB962C8B-B14F-4D97-AF65-F5344CB8AC3E}">
+        <p14:creationId xmlns:p14="http://schemas.microsoft.com/office/powerpoint/2010/main" val="611661283"/>
+      </p:ext>
+    </p:extLst>
+  </p:cSld>
+  <p:clrMapOvr>
+    <a:masterClrMapping/>
+  </p:clrMapOvr>
+</p:sld>
+</file>
+
+<file path=ppt/slides/slide7.xml><?xml version="1.0" encoding="utf-8"?>
+<p:sld xmlns:a="http://schemas.openxmlformats.org/drawingml/2006/main" xmlns:r="http://schemas.openxmlformats.org/officeDocument/2006/relationships" xmlns:p="http://schemas.openxmlformats.org/presentationml/2006/main">
+  <p:cSld>
+    <p:spTree>
+      <p:nvGrpSpPr>
+        <p:cNvPr id="1" name=""/>
+        <p:cNvGrpSpPr/>
+        <p:nvPr/>
+      </p:nvGrpSpPr>
+      <p:grpSpPr>
+        <a:xfrm>
+          <a:off x="0" y="0"/>
+          <a:ext cx="0" cy="0"/>
+          <a:chOff x="0" y="0"/>
+          <a:chExt cx="0" cy="0"/>
+        </a:xfrm>
+      </p:grpSpPr>
+      <p:sp>
+        <p:nvSpPr>
+          <p:cNvPr id="2" name="Title 1">
+            <a:extLst>
+              <a:ext uri="{FF2B5EF4-FFF2-40B4-BE49-F238E27FC236}">
+                <a16:creationId xmlns:a16="http://schemas.microsoft.com/office/drawing/2014/main" id="{5CA9C39C-EF0C-6E05-4C5C-D37E16EB8947}"/>
+              </a:ext>
+            </a:extLst>
+          </p:cNvPr>
+          <p:cNvSpPr>
+            <a:spLocks noGrp="1"/>
+          </p:cNvSpPr>
+          <p:nvPr>
+            <p:ph type="title"/>
+          </p:nvPr>
+        </p:nvSpPr>
+        <p:spPr/>
+        <p:txBody>
+          <a:bodyPr/>
+          <a:lstStyle/>
+          <a:p>
+            <a:r>
+              <a:rPr lang="en-US" dirty="0"/>
+              <a:t>Proposed system</a:t>
+            </a:r>
+            <a:endParaRPr lang="en-IN" dirty="0"/>
+          </a:p>
+        </p:txBody>
+      </p:sp>
+      <p:sp>
+        <p:nvSpPr>
+          <p:cNvPr id="3" name="Content Placeholder 2">
+            <a:extLst>
+              <a:ext uri="{FF2B5EF4-FFF2-40B4-BE49-F238E27FC236}">
+                <a16:creationId xmlns:a16="http://schemas.microsoft.com/office/drawing/2014/main" id="{24192475-7037-A954-D08D-4D3EE2D39B25}"/>
+              </a:ext>
+            </a:extLst>
+          </p:cNvPr>
+          <p:cNvSpPr>
+            <a:spLocks noGrp="1"/>
+          </p:cNvSpPr>
+          <p:nvPr>
+            <p:ph idx="1"/>
+          </p:nvPr>
+        </p:nvSpPr>
+        <p:spPr/>
+        <p:txBody>
+          <a:bodyPr>
+            <a:normAutofit/>
+          </a:bodyPr>
+          <a:lstStyle/>
+          <a:p>
+            <a:pPr lvl="1"/>
+            <a:r>
+              <a:rPr lang="en-US" sz="2400" dirty="0"/>
+              <a:t>The proposed system is an ML model that utilizes mainly 2 algorithms: Linear Regression &amp; Random Forest Regressor.</a:t>
+            </a:r>
+          </a:p>
+          <a:p>
+            <a:pPr lvl="1"/>
+            <a:r>
+              <a:rPr lang="en-US" sz="2400" dirty="0"/>
+              <a:t>The proposed system addresses the drawbacks of the traditional methods by incorporating more accurate and efficient algorithm for prediction.</a:t>
+            </a:r>
+          </a:p>
+          <a:p>
+            <a:pPr lvl="1"/>
+            <a:r>
+              <a:rPr lang="en-US" sz="2400" dirty="0"/>
+              <a:t>The model is then evaluated for accuracy by rigorously testing it with test data and comparing the predicted values with actual values.</a:t>
+            </a:r>
+          </a:p>
+          <a:p>
+            <a:pPr lvl="1"/>
+            <a:r>
+              <a:rPr lang="en-US" sz="2400" dirty="0"/>
+              <a:t>The stages that ML model undergoes are: Feature selection, Data pre-processing, Model selection, Cross-validation.</a:t>
+            </a:r>
+            <a:endParaRPr lang="en-IN" sz="2400" dirty="0"/>
+          </a:p>
+        </p:txBody>
+      </p:sp>
+    </p:spTree>
+    <p:extLst>
+      <p:ext uri="{BB962C8B-B14F-4D97-AF65-F5344CB8AC3E}">
+        <p14:creationId xmlns:p14="http://schemas.microsoft.com/office/powerpoint/2010/main" val="3913472597"/>
+      </p:ext>
+    </p:extLst>
+  </p:cSld>
+  <p:clrMapOvr>
+    <a:masterClrMapping/>
+  </p:clrMapOvr>
+</p:sld>
+</file>
+
+<file path=ppt/slides/slide8.xml><?xml version="1.0" encoding="utf-8"?>
+<p:sld xmlns:a="http://schemas.openxmlformats.org/drawingml/2006/main" xmlns:r="http://schemas.openxmlformats.org/officeDocument/2006/relationships" xmlns:p="http://schemas.openxmlformats.org/presentationml/2006/main">
+  <p:cSld>
+    <p:spTree>
+      <p:nvGrpSpPr>
+        <p:cNvPr id="1" name=""/>
+        <p:cNvGrpSpPr/>
+        <p:nvPr/>
+      </p:nvGrpSpPr>
+      <p:grpSpPr>
+        <a:xfrm>
+          <a:off x="0" y="0"/>
+          <a:ext cx="0" cy="0"/>
+          <a:chOff x="0" y="0"/>
+          <a:chExt cx="0" cy="0"/>
+        </a:xfrm>
+      </p:grpSpPr>
+      <p:sp>
+        <p:nvSpPr>
+          <p:cNvPr id="2" name="Title 1">
+            <a:extLst>
+              <a:ext uri="{FF2B5EF4-FFF2-40B4-BE49-F238E27FC236}">
+                <a16:creationId xmlns:a16="http://schemas.microsoft.com/office/drawing/2014/main" id="{D7A1F125-0780-5918-148C-959184CED677}"/>
+              </a:ext>
+            </a:extLst>
+          </p:cNvPr>
+          <p:cNvSpPr>
+            <a:spLocks noGrp="1"/>
+          </p:cNvSpPr>
+          <p:nvPr>
+            <p:ph type="title"/>
+          </p:nvPr>
+        </p:nvSpPr>
+        <p:spPr>
+          <a:xfrm>
+            <a:off x="1024128" y="187919"/>
+            <a:ext cx="9720072" cy="1499616"/>
+          </a:xfrm>
+        </p:spPr>
+        <p:txBody>
+          <a:bodyPr/>
+          <a:lstStyle/>
+          <a:p>
+            <a:r>
+              <a:rPr lang="en-US" dirty="0"/>
+              <a:t>modules</a:t>
+            </a:r>
+            <a:endParaRPr lang="en-IN" dirty="0"/>
+          </a:p>
+        </p:txBody>
+      </p:sp>
+      <p:sp>
+        <p:nvSpPr>
+          <p:cNvPr id="3" name="Content Placeholder 2">
+            <a:extLst>
+              <a:ext uri="{FF2B5EF4-FFF2-40B4-BE49-F238E27FC236}">
+                <a16:creationId xmlns:a16="http://schemas.microsoft.com/office/drawing/2014/main" id="{87CC1B83-68C3-20A0-8C68-C9D4125A4621}"/>
+              </a:ext>
+            </a:extLst>
+          </p:cNvPr>
+          <p:cNvSpPr>
+            <a:spLocks noGrp="1"/>
+          </p:cNvSpPr>
+          <p:nvPr>
+            <p:ph idx="1"/>
+          </p:nvPr>
+        </p:nvSpPr>
+        <p:spPr>
+          <a:xfrm>
+            <a:off x="1024127" y="1417320"/>
+            <a:ext cx="9720073" cy="4023360"/>
+          </a:xfrm>
+        </p:spPr>
+        <p:txBody>
+          <a:bodyPr/>
+          <a:lstStyle/>
+          <a:p>
+            <a:pPr lvl="1"/>
+            <a:r>
+              <a:rPr lang="en-US" sz="2400" dirty="0"/>
+              <a:t>Linear Regression:</a:t>
+            </a:r>
+          </a:p>
+          <a:p>
+            <a:pPr lvl="2"/>
+            <a:r>
+              <a:rPr lang="en-US" sz="2000" dirty="0"/>
+              <a:t>Linear regression is a statistical modeling technique used to establish a relationship between dependent variable and one or more independent variables.</a:t>
+            </a:r>
+          </a:p>
+          <a:p>
+            <a:pPr lvl="2"/>
+            <a:r>
+              <a:rPr lang="en-US" sz="2000" dirty="0"/>
+              <a:t>In linear regression model, the dependent variable is assumed to be linear function of independent variables.</a:t>
+            </a:r>
+          </a:p>
+          <a:p>
+            <a:pPr lvl="2"/>
+            <a:r>
+              <a:rPr lang="en-US" sz="2000" dirty="0"/>
+              <a:t>The objective of this model is to predict the value of the dependent variable based on the values of the independent variables.</a:t>
+            </a:r>
+          </a:p>
+          <a:p>
+            <a:pPr lvl="2"/>
+            <a:r>
+              <a:rPr lang="en-US" sz="2000" dirty="0"/>
+              <a:t>Linear regression fits a straight line that minimizes discrepancies between the predicted and actual output values.</a:t>
+            </a:r>
+          </a:p>
+          <a:p>
+            <a:pPr lvl="2"/>
+            <a:endParaRPr lang="en-US" dirty="0"/>
+          </a:p>
+        </p:txBody>
+      </p:sp>
+      <p:pic>
+        <p:nvPicPr>
+          <p:cNvPr id="5" name="Picture 4">
+            <a:extLst>
+              <a:ext uri="{FF2B5EF4-FFF2-40B4-BE49-F238E27FC236}">
+                <a16:creationId xmlns:a16="http://schemas.microsoft.com/office/drawing/2014/main" id="{A27D9D2B-BEEF-3B13-A85D-73927A7F577D}"/>
+              </a:ext>
+            </a:extLst>
+          </p:cNvPr>
+          <p:cNvPicPr>
+            <a:picLocks noChangeAspect="1"/>
+          </p:cNvPicPr>
+          <p:nvPr/>
+        </p:nvPicPr>
+        <p:blipFill>
+          <a:blip r:embed="rId2"/>
+          <a:stretch>
+            <a:fillRect/>
+          </a:stretch>
+        </p:blipFill>
+        <p:spPr>
+          <a:xfrm>
+            <a:off x="4413379" y="4078573"/>
+            <a:ext cx="3497566" cy="2396872"/>
+          </a:xfrm>
+          <a:prstGeom prst="rect">
+            <a:avLst/>
+          </a:prstGeom>
+        </p:spPr>
+      </p:pic>
+    </p:spTree>
+    <p:extLst>
+      <p:ext uri="{BB962C8B-B14F-4D97-AF65-F5344CB8AC3E}">
+        <p14:creationId xmlns:p14="http://schemas.microsoft.com/office/powerpoint/2010/main" val="2440851470"/>
+      </p:ext>
+    </p:extLst>
+  </p:cSld>
+  <p:clrMapOvr>
+    <a:masterClrMapping/>
+  </p:clrMapOvr>
+</p:sld>
+</file>
+
+<file path=ppt/slides/slide9.xml><?xml version="1.0" encoding="utf-8"?>
+<p:sld xmlns:a="http://schemas.openxmlformats.org/drawingml/2006/main" xmlns:r="http://schemas.openxmlformats.org/officeDocument/2006/relationships" xmlns:p="http://schemas.openxmlformats.org/presentationml/2006/main">
+  <p:cSld>
+    <p:spTree>
+      <p:nvGrpSpPr>
+        <p:cNvPr id="1" name=""/>
+        <p:cNvGrpSpPr/>
+        <p:nvPr/>
+      </p:nvGrpSpPr>
+      <p:grpSpPr>
+        <a:xfrm>
+          <a:off x="0" y="0"/>
+          <a:ext cx="0" cy="0"/>
+          <a:chOff x="0" y="0"/>
+          <a:chExt cx="0" cy="0"/>
+        </a:xfrm>
+      </p:grpSpPr>
+      <p:sp>
+        <p:nvSpPr>
+          <p:cNvPr id="2" name="Title 1">
+            <a:extLst>
+              <a:ext uri="{FF2B5EF4-FFF2-40B4-BE49-F238E27FC236}">
+                <a16:creationId xmlns:a16="http://schemas.microsoft.com/office/drawing/2014/main" id="{EAA1A98E-1A59-5989-008E-3769C8CE8075}"/>
+              </a:ext>
+            </a:extLst>
+          </p:cNvPr>
+          <p:cNvSpPr>
+            <a:spLocks noGrp="1"/>
+          </p:cNvSpPr>
+          <p:nvPr>
+            <p:ph type="title"/>
+          </p:nvPr>
+        </p:nvSpPr>
+        <p:spPr/>
+        <p:txBody>
+          <a:bodyPr/>
+          <a:lstStyle/>
+          <a:p>
+            <a:r>
+              <a:rPr lang="en-US" dirty="0"/>
+              <a:t>Modules </a:t>
+            </a:r>
+            <a:r>
+              <a:rPr lang="en-US" dirty="0" err="1"/>
+              <a:t>contd</a:t>
+            </a:r>
+            <a:r>
+              <a:rPr lang="en-US" dirty="0"/>
+              <a:t>…</a:t>
+            </a:r>
+            <a:endParaRPr lang="en-IN" dirty="0"/>
+          </a:p>
+        </p:txBody>
+      </p:sp>
+      <p:sp>
+        <p:nvSpPr>
+          <p:cNvPr id="3" name="Content Placeholder 2">
+            <a:extLst>
+              <a:ext uri="{FF2B5EF4-FFF2-40B4-BE49-F238E27FC236}">
+                <a16:creationId xmlns:a16="http://schemas.microsoft.com/office/drawing/2014/main" id="{7B67DF2C-98C0-1192-5AA4-056FC201E5AB}"/>
+              </a:ext>
+            </a:extLst>
+          </p:cNvPr>
+          <p:cNvSpPr>
+            <a:spLocks noGrp="1"/>
+          </p:cNvSpPr>
+          <p:nvPr>
+            <p:ph idx="1"/>
+          </p:nvPr>
+        </p:nvSpPr>
+        <p:spPr/>
+        <p:txBody>
+          <a:bodyPr/>
+          <a:lstStyle/>
+          <a:p>
+            <a:pPr lvl="1"/>
+            <a:r>
+              <a:rPr lang="en-US" sz="2400" dirty="0"/>
+              <a:t>Random Forest Trees:</a:t>
+            </a:r>
+          </a:p>
+          <a:p>
+            <a:pPr lvl="2"/>
+            <a:r>
+              <a:rPr lang="en-US" sz="2000" dirty="0"/>
+              <a:t>Random forest consists of large number of individual decision trees that operate as an ensemble method.</a:t>
+            </a:r>
+          </a:p>
+          <a:p>
+            <a:pPr lvl="2"/>
+            <a:r>
+              <a:rPr lang="en-US" sz="2000" dirty="0"/>
+              <a:t>Each individual tree in the random forest splits out a class prediction and the class with most votes becomes our model’s prediction.</a:t>
+            </a:r>
+          </a:p>
+          <a:p>
+            <a:pPr lvl="2"/>
+            <a:r>
+              <a:rPr lang="en-US" sz="2000" dirty="0"/>
+              <a:t>Random forest are based on 2 key concepts names “Bagging” and “feature selection”.</a:t>
+            </a:r>
+          </a:p>
+          <a:p>
+            <a:pPr lvl="2"/>
+            <a:r>
+              <a:rPr lang="en-US" sz="2000" dirty="0"/>
+              <a:t>The key principle underlying the random forest approach comprises the construction of many “simple” trees in training stage and majority vote is taken for the output.</a:t>
+            </a:r>
+          </a:p>
+          <a:p>
+            <a:pPr lvl="2"/>
+            <a:endParaRPr lang="en-IN" dirty="0"/>
+          </a:p>
+        </p:txBody>
+      </p:sp>
+      <p:pic>
+        <p:nvPicPr>
+          <p:cNvPr id="5" name="Picture 4">
+            <a:extLst>
+              <a:ext uri="{FF2B5EF4-FFF2-40B4-BE49-F238E27FC236}">
+                <a16:creationId xmlns:a16="http://schemas.microsoft.com/office/drawing/2014/main" id="{53E1559A-F2FC-438E-7AB5-E6830ECDE271}"/>
+              </a:ext>
+            </a:extLst>
+          </p:cNvPr>
+          <p:cNvPicPr>
+            <a:picLocks noChangeAspect="1"/>
+          </p:cNvPicPr>
+          <p:nvPr/>
+        </p:nvPicPr>
+        <p:blipFill>
+          <a:blip r:embed="rId2"/>
+          <a:stretch>
+            <a:fillRect/>
+          </a:stretch>
+        </p:blipFill>
+        <p:spPr>
+          <a:xfrm>
+            <a:off x="1334277" y="4894537"/>
+            <a:ext cx="2143048" cy="1849331"/>
+          </a:xfrm>
+          <a:prstGeom prst="rect">
+            <a:avLst/>
+          </a:prstGeom>
+        </p:spPr>
+      </p:pic>
+    </p:spTree>
+    <p:extLst>
+      <p:ext uri="{BB962C8B-B14F-4D97-AF65-F5344CB8AC3E}">
+        <p14:creationId xmlns:p14="http://schemas.microsoft.com/office/powerpoint/2010/main" val="1745376994"/>
       </p:ext>
     </p:extLst>
   </p:cSld>

</xml_diff>